<commit_message>
fixing submission folder again
</commit_message>
<xml_diff>
--- a/Team ASK project/JelBlob_Presentation_Final_WithoutVideo.pptx
+++ b/Team ASK project/JelBlob_Presentation_Final_WithoutVideo.pptx
@@ -211,7 +211,7 @@
           <a:p>
             <a:fld id="{9143A75C-4E93-4E57-8FE0-0B5536F2214D}" type="datetimeFigureOut">
               <a:rPr lang="en-US" smtClean="0"/>
-              <a:t>11/27/2017</a:t>
+              <a:t>11/28/2017</a:t>
             </a:fld>
             <a:endParaRPr lang="en-US"/>
           </a:p>
@@ -2124,7 +2124,7 @@
           <a:p>
             <a:fld id="{349AB840-55CF-4B95-A905-70A2B172BCA3}" type="datetimeFigureOut">
               <a:rPr lang="en-GB" smtClean="0"/>
-              <a:t>27/11/2017</a:t>
+              <a:t>28/11/2017</a:t>
             </a:fld>
             <a:endParaRPr lang="en-GB"/>
           </a:p>
@@ -2436,7 +2436,7 @@
           <a:p>
             <a:fld id="{349AB840-55CF-4B95-A905-70A2B172BCA3}" type="datetimeFigureOut">
               <a:rPr lang="en-GB" smtClean="0"/>
-              <a:t>27/11/2017</a:t>
+              <a:t>28/11/2017</a:t>
             </a:fld>
             <a:endParaRPr lang="en-GB"/>
           </a:p>
@@ -2658,7 +2658,7 @@
           <a:p>
             <a:fld id="{349AB840-55CF-4B95-A905-70A2B172BCA3}" type="datetimeFigureOut">
               <a:rPr lang="en-GB" smtClean="0"/>
-              <a:t>27/11/2017</a:t>
+              <a:t>28/11/2017</a:t>
             </a:fld>
             <a:endParaRPr lang="en-GB"/>
           </a:p>
@@ -2949,7 +2949,7 @@
           <a:p>
             <a:fld id="{349AB840-55CF-4B95-A905-70A2B172BCA3}" type="datetimeFigureOut">
               <a:rPr lang="en-GB" smtClean="0"/>
-              <a:t>27/11/2017</a:t>
+              <a:t>28/11/2017</a:t>
             </a:fld>
             <a:endParaRPr lang="en-GB"/>
           </a:p>
@@ -3403,7 +3403,7 @@
           <a:p>
             <a:fld id="{349AB840-55CF-4B95-A905-70A2B172BCA3}" type="datetimeFigureOut">
               <a:rPr lang="en-GB" smtClean="0"/>
-              <a:t>27/11/2017</a:t>
+              <a:t>28/11/2017</a:t>
             </a:fld>
             <a:endParaRPr lang="en-GB"/>
           </a:p>
@@ -3979,7 +3979,7 @@
           <a:p>
             <a:fld id="{349AB840-55CF-4B95-A905-70A2B172BCA3}" type="datetimeFigureOut">
               <a:rPr lang="en-GB" smtClean="0"/>
-              <a:t>27/11/2017</a:t>
+              <a:t>28/11/2017</a:t>
             </a:fld>
             <a:endParaRPr lang="en-GB"/>
           </a:p>
@@ -4831,7 +4831,7 @@
           <a:p>
             <a:fld id="{349AB840-55CF-4B95-A905-70A2B172BCA3}" type="datetimeFigureOut">
               <a:rPr lang="en-GB" smtClean="0"/>
-              <a:t>27/11/2017</a:t>
+              <a:t>28/11/2017</a:t>
             </a:fld>
             <a:endParaRPr lang="en-GB"/>
           </a:p>
@@ -5036,7 +5036,7 @@
           <a:p>
             <a:fld id="{349AB840-55CF-4B95-A905-70A2B172BCA3}" type="datetimeFigureOut">
               <a:rPr lang="en-GB" smtClean="0"/>
-              <a:t>27/11/2017</a:t>
+              <a:t>28/11/2017</a:t>
             </a:fld>
             <a:endParaRPr lang="en-GB"/>
           </a:p>
@@ -5250,7 +5250,7 @@
           <a:p>
             <a:fld id="{349AB840-55CF-4B95-A905-70A2B172BCA3}" type="datetimeFigureOut">
               <a:rPr lang="en-GB" smtClean="0"/>
-              <a:t>27/11/2017</a:t>
+              <a:t>28/11/2017</a:t>
             </a:fld>
             <a:endParaRPr lang="en-GB"/>
           </a:p>
@@ -5455,7 +5455,7 @@
           <a:p>
             <a:fld id="{349AB840-55CF-4B95-A905-70A2B172BCA3}" type="datetimeFigureOut">
               <a:rPr lang="en-GB" smtClean="0"/>
-              <a:t>27/11/2017</a:t>
+              <a:t>28/11/2017</a:t>
             </a:fld>
             <a:endParaRPr lang="en-GB"/>
           </a:p>
@@ -5735,7 +5735,7 @@
           <a:p>
             <a:fld id="{349AB840-55CF-4B95-A905-70A2B172BCA3}" type="datetimeFigureOut">
               <a:rPr lang="en-GB" smtClean="0"/>
-              <a:t>27/11/2017</a:t>
+              <a:t>28/11/2017</a:t>
             </a:fld>
             <a:endParaRPr lang="en-GB"/>
           </a:p>
@@ -6002,7 +6002,7 @@
           <a:p>
             <a:fld id="{349AB840-55CF-4B95-A905-70A2B172BCA3}" type="datetimeFigureOut">
               <a:rPr lang="en-GB" smtClean="0"/>
-              <a:t>27/11/2017</a:t>
+              <a:t>28/11/2017</a:t>
             </a:fld>
             <a:endParaRPr lang="en-GB"/>
           </a:p>
@@ -6417,7 +6417,7 @@
           <a:p>
             <a:fld id="{349AB840-55CF-4B95-A905-70A2B172BCA3}" type="datetimeFigureOut">
               <a:rPr lang="en-GB" smtClean="0"/>
-              <a:t>27/11/2017</a:t>
+              <a:t>28/11/2017</a:t>
             </a:fld>
             <a:endParaRPr lang="en-GB"/>
           </a:p>
@@ -6565,7 +6565,7 @@
           <a:p>
             <a:fld id="{349AB840-55CF-4B95-A905-70A2B172BCA3}" type="datetimeFigureOut">
               <a:rPr lang="en-GB" smtClean="0"/>
-              <a:t>27/11/2017</a:t>
+              <a:t>28/11/2017</a:t>
             </a:fld>
             <a:endParaRPr lang="en-GB"/>
           </a:p>
@@ -6690,7 +6690,7 @@
           <a:p>
             <a:fld id="{349AB840-55CF-4B95-A905-70A2B172BCA3}" type="datetimeFigureOut">
               <a:rPr lang="en-GB" smtClean="0"/>
-              <a:t>27/11/2017</a:t>
+              <a:t>28/11/2017</a:t>
             </a:fld>
             <a:endParaRPr lang="en-GB"/>
           </a:p>
@@ -6969,7 +6969,7 @@
           <a:p>
             <a:fld id="{349AB840-55CF-4B95-A905-70A2B172BCA3}" type="datetimeFigureOut">
               <a:rPr lang="en-GB" smtClean="0"/>
-              <a:t>27/11/2017</a:t>
+              <a:t>28/11/2017</a:t>
             </a:fld>
             <a:endParaRPr lang="en-GB"/>
           </a:p>
@@ -7281,7 +7281,7 @@
           <a:p>
             <a:fld id="{349AB840-55CF-4B95-A905-70A2B172BCA3}" type="datetimeFigureOut">
               <a:rPr lang="en-GB" smtClean="0"/>
-              <a:t>27/11/2017</a:t>
+              <a:t>28/11/2017</a:t>
             </a:fld>
             <a:endParaRPr lang="en-GB"/>
           </a:p>
@@ -7534,7 +7534,7 @@
           <a:p>
             <a:fld id="{349AB840-55CF-4B95-A905-70A2B172BCA3}" type="datetimeFigureOut">
               <a:rPr lang="en-GB" smtClean="0"/>
-              <a:t>27/11/2017</a:t>
+              <a:t>28/11/2017</a:t>
             </a:fld>
             <a:endParaRPr lang="en-GB"/>
           </a:p>
@@ -8461,7 +8461,7 @@
                                         <p:tgtEl>
                                           <p:spTgt spid="3">
                                             <p:txEl>
-                                              <p:pRg st="1" end="1"/>
+                                              <p:pRg st="0" end="0"/>
                                             </p:txEl>
                                           </p:spTgt>
                                         </p:tgtEl>
@@ -8479,7 +8479,7 @@
                                         <p:tgtEl>
                                           <p:spTgt spid="3">
                                             <p:txEl>
-                                              <p:pRg st="1" end="1"/>
+                                              <p:pRg st="0" end="0"/>
                                             </p:txEl>
                                           </p:spTgt>
                                         </p:tgtEl>
@@ -8522,7 +8522,7 @@
                                         <p:tgtEl>
                                           <p:spTgt spid="3">
                                             <p:txEl>
-                                              <p:pRg st="0" end="0"/>
+                                              <p:pRg st="1" end="1"/>
                                             </p:txEl>
                                           </p:spTgt>
                                         </p:tgtEl>
@@ -8540,7 +8540,7 @@
                                         <p:tgtEl>
                                           <p:spTgt spid="3">
                                             <p:txEl>
-                                              <p:pRg st="0" end="0"/>
+                                              <p:pRg st="1" end="1"/>
                                             </p:txEl>
                                           </p:spTgt>
                                         </p:tgtEl>
@@ -12186,6 +12186,13 @@
       </p:transition>
     </mc:Fallback>
   </mc:AlternateContent>
+  <p:timing>
+    <p:tnLst>
+      <p:par>
+        <p:cTn id="1" dur="indefinite" restart="never" nodeType="tmRoot"/>
+      </p:par>
+    </p:tnLst>
+  </p:timing>
 </p:sld>
 </file>
 
@@ -12266,9 +12273,17 @@
               <a:rPr lang="en-GB" dirty="0"/>
               <a:t>Thank you for listening!</a:t>
             </a:r>
+            <a:r>
+              <a:rPr lang="en-GB" u="sng" dirty="0"/>
+              <a:t/>
+            </a:r>
             <a:br>
               <a:rPr lang="en-GB" u="sng" dirty="0"/>
             </a:br>
+            <a:r>
+              <a:rPr lang="en-GB" u="sng" dirty="0"/>
+              <a:t/>
+            </a:r>
             <a:br>
               <a:rPr lang="en-GB" u="sng" dirty="0"/>
             </a:br>
@@ -12301,6 +12316,13 @@
       </p:transition>
     </mc:Fallback>
   </mc:AlternateContent>
+  <p:timing>
+    <p:tnLst>
+      <p:par>
+        <p:cTn id="1" dur="indefinite" restart="never" nodeType="tmRoot"/>
+      </p:par>
+    </p:tnLst>
+  </p:timing>
 </p:sld>
 </file>
 

</xml_diff>